<commit_message>
Early test figures for FFT filtering
</commit_message>
<xml_diff>
--- a/FFT_results_preview.pptx
+++ b/FFT_results_preview.pptx
@@ -6,6 +6,10 @@
   </p:sldMasterIdLst>
   <p:sldIdLst>
     <p:sldId id="258" r:id="rId2"/>
+    <p:sldId id="259" r:id="rId3"/>
+    <p:sldId id="260" r:id="rId4"/>
+    <p:sldId id="261" r:id="rId5"/>
+    <p:sldId id="262" r:id="rId6"/>
   </p:sldIdLst>
   <p:sldSz cx="12192000" cy="6858000"/>
   <p:notesSz cx="6858000" cy="9144000"/>
@@ -261,7 +265,7 @@
           <a:p>
             <a:fld id="{1507841A-3D92-1144-914E-67EBAFB4BA40}" type="datetimeFigureOut">
               <a:rPr lang="en-TW" smtClean="0"/>
-              <a:t>2023/9/27</a:t>
+              <a:t>2023/9/28</a:t>
             </a:fld>
             <a:endParaRPr lang="en-TW"/>
           </a:p>
@@ -461,7 +465,7 @@
           <a:p>
             <a:fld id="{1507841A-3D92-1144-914E-67EBAFB4BA40}" type="datetimeFigureOut">
               <a:rPr lang="en-TW" smtClean="0"/>
-              <a:t>2023/9/27</a:t>
+              <a:t>2023/9/28</a:t>
             </a:fld>
             <a:endParaRPr lang="en-TW"/>
           </a:p>
@@ -671,7 +675,7 @@
           <a:p>
             <a:fld id="{1507841A-3D92-1144-914E-67EBAFB4BA40}" type="datetimeFigureOut">
               <a:rPr lang="en-TW" smtClean="0"/>
-              <a:t>2023/9/27</a:t>
+              <a:t>2023/9/28</a:t>
             </a:fld>
             <a:endParaRPr lang="en-TW"/>
           </a:p>
@@ -871,7 +875,7 @@
           <a:p>
             <a:fld id="{1507841A-3D92-1144-914E-67EBAFB4BA40}" type="datetimeFigureOut">
               <a:rPr lang="en-TW" smtClean="0"/>
-              <a:t>2023/9/27</a:t>
+              <a:t>2023/9/28</a:t>
             </a:fld>
             <a:endParaRPr lang="en-TW"/>
           </a:p>
@@ -1147,7 +1151,7 @@
           <a:p>
             <a:fld id="{1507841A-3D92-1144-914E-67EBAFB4BA40}" type="datetimeFigureOut">
               <a:rPr lang="en-TW" smtClean="0"/>
-              <a:t>2023/9/27</a:t>
+              <a:t>2023/9/28</a:t>
             </a:fld>
             <a:endParaRPr lang="en-TW"/>
           </a:p>
@@ -1415,7 +1419,7 @@
           <a:p>
             <a:fld id="{1507841A-3D92-1144-914E-67EBAFB4BA40}" type="datetimeFigureOut">
               <a:rPr lang="en-TW" smtClean="0"/>
-              <a:t>2023/9/27</a:t>
+              <a:t>2023/9/28</a:t>
             </a:fld>
             <a:endParaRPr lang="en-TW"/>
           </a:p>
@@ -1830,7 +1834,7 @@
           <a:p>
             <a:fld id="{1507841A-3D92-1144-914E-67EBAFB4BA40}" type="datetimeFigureOut">
               <a:rPr lang="en-TW" smtClean="0"/>
-              <a:t>2023/9/27</a:t>
+              <a:t>2023/9/28</a:t>
             </a:fld>
             <a:endParaRPr lang="en-TW"/>
           </a:p>
@@ -1972,7 +1976,7 @@
           <a:p>
             <a:fld id="{1507841A-3D92-1144-914E-67EBAFB4BA40}" type="datetimeFigureOut">
               <a:rPr lang="en-TW" smtClean="0"/>
-              <a:t>2023/9/27</a:t>
+              <a:t>2023/9/28</a:t>
             </a:fld>
             <a:endParaRPr lang="en-TW"/>
           </a:p>
@@ -2085,7 +2089,7 @@
           <a:p>
             <a:fld id="{1507841A-3D92-1144-914E-67EBAFB4BA40}" type="datetimeFigureOut">
               <a:rPr lang="en-TW" smtClean="0"/>
-              <a:t>2023/9/27</a:t>
+              <a:t>2023/9/28</a:t>
             </a:fld>
             <a:endParaRPr lang="en-TW"/>
           </a:p>
@@ -2398,7 +2402,7 @@
           <a:p>
             <a:fld id="{1507841A-3D92-1144-914E-67EBAFB4BA40}" type="datetimeFigureOut">
               <a:rPr lang="en-TW" smtClean="0"/>
-              <a:t>2023/9/27</a:t>
+              <a:t>2023/9/28</a:t>
             </a:fld>
             <a:endParaRPr lang="en-TW"/>
           </a:p>
@@ -2687,7 +2691,7 @@
           <a:p>
             <a:fld id="{1507841A-3D92-1144-914E-67EBAFB4BA40}" type="datetimeFigureOut">
               <a:rPr lang="en-TW" smtClean="0"/>
-              <a:t>2023/9/27</a:t>
+              <a:t>2023/9/28</a:t>
             </a:fld>
             <a:endParaRPr lang="en-TW"/>
           </a:p>
@@ -2930,7 +2934,7 @@
           <a:p>
             <a:fld id="{1507841A-3D92-1144-914E-67EBAFB4BA40}" type="datetimeFigureOut">
               <a:rPr lang="en-TW" smtClean="0"/>
-              <a:t>2023/9/27</a:t>
+              <a:t>2023/9/28</a:t>
             </a:fld>
             <a:endParaRPr lang="en-TW"/>
           </a:p>
@@ -3399,13 +3403,12 @@
         </p:nvPicPr>
         <p:blipFill>
           <a:blip r:embed="rId2"/>
-          <a:stretch>
-            <a:fillRect/>
-          </a:stretch>
+          <a:srcRect/>
+          <a:stretch/>
         </p:blipFill>
         <p:spPr>
           <a:xfrm>
-            <a:off x="294216" y="1971788"/>
+            <a:off x="294216" y="1636122"/>
             <a:ext cx="5801784" cy="4351338"/>
           </a:xfrm>
         </p:spPr>
@@ -3431,7 +3434,7 @@
         </p:blipFill>
         <p:spPr>
           <a:xfrm>
-            <a:off x="6096000" y="1971788"/>
+            <a:off x="6096000" y="1636122"/>
             <a:ext cx="5801784" cy="4351338"/>
           </a:xfrm>
           <a:prstGeom prst="rect">
@@ -3453,7 +3456,7 @@
         </p:nvSpPr>
         <p:spPr>
           <a:xfrm>
-            <a:off x="1521316" y="1602456"/>
+            <a:off x="1521316" y="1266790"/>
             <a:ext cx="3347583" cy="369332"/>
           </a:xfrm>
           <a:prstGeom prst="rect">
@@ -3489,7 +3492,7 @@
         </p:nvSpPr>
         <p:spPr>
           <a:xfrm>
-            <a:off x="6653205" y="1602456"/>
+            <a:off x="6653205" y="1266790"/>
             <a:ext cx="4687373" cy="646331"/>
           </a:xfrm>
           <a:prstGeom prst="rect">
@@ -3518,10 +3521,1112 @@
           </a:p>
         </p:txBody>
       </p:sp>
+      <p:sp>
+        <p:nvSpPr>
+          <p:cNvPr id="3" name="TextBox 2">
+            <a:extLst>
+              <a:ext uri="{FF2B5EF4-FFF2-40B4-BE49-F238E27FC236}">
+                <a16:creationId xmlns:a16="http://schemas.microsoft.com/office/drawing/2014/main" id="{70ACE0C1-A620-B5D9-5C30-22F96248C311}"/>
+              </a:ext>
+            </a:extLst>
+          </p:cNvPr>
+          <p:cNvSpPr txBox="1"/>
+          <p:nvPr/>
+        </p:nvSpPr>
+        <p:spPr>
+          <a:xfrm>
+            <a:off x="2464012" y="6125959"/>
+            <a:ext cx="7263976" cy="461665"/>
+          </a:xfrm>
+          <a:prstGeom prst="rect">
+            <a:avLst/>
+          </a:prstGeom>
+          <a:noFill/>
+        </p:spPr>
+        <p:txBody>
+          <a:bodyPr wrap="none" rtlCol="0">
+            <a:spAutoFit/>
+          </a:bodyPr>
+          <a:lstStyle/>
+          <a:p>
+            <a:r>
+              <a:rPr lang="en-TW" sz="2400" dirty="0"/>
+              <a:t>NOTA: NaNs in original map set to zero so I can use np.fft</a:t>
+            </a:r>
+          </a:p>
+        </p:txBody>
+      </p:sp>
     </p:spTree>
     <p:extLst>
       <p:ext uri="{BB962C8B-B14F-4D97-AF65-F5344CB8AC3E}">
         <p14:creationId xmlns:p14="http://schemas.microsoft.com/office/powerpoint/2010/main" val="818577169"/>
+      </p:ext>
+    </p:extLst>
+  </p:cSld>
+  <p:clrMapOvr>
+    <a:masterClrMapping/>
+  </p:clrMapOvr>
+</p:sld>
+</file>
+
+<file path=ppt/slides/slide2.xml><?xml version="1.0" encoding="utf-8"?>
+<p:sld xmlns:a="http://schemas.openxmlformats.org/drawingml/2006/main" xmlns:r="http://schemas.openxmlformats.org/officeDocument/2006/relationships" xmlns:p="http://schemas.openxmlformats.org/presentationml/2006/main">
+  <p:cSld>
+    <p:spTree>
+      <p:nvGrpSpPr>
+        <p:cNvPr id="1" name=""/>
+        <p:cNvGrpSpPr/>
+        <p:nvPr/>
+      </p:nvGrpSpPr>
+      <p:grpSpPr>
+        <a:xfrm>
+          <a:off x="0" y="0"/>
+          <a:ext cx="0" cy="0"/>
+          <a:chOff x="0" y="0"/>
+          <a:chExt cx="0" cy="0"/>
+        </a:xfrm>
+      </p:grpSpPr>
+      <p:sp>
+        <p:nvSpPr>
+          <p:cNvPr id="2" name="Title 1">
+            <a:extLst>
+              <a:ext uri="{FF2B5EF4-FFF2-40B4-BE49-F238E27FC236}">
+                <a16:creationId xmlns:a16="http://schemas.microsoft.com/office/drawing/2014/main" id="{6936AB41-D0FB-0596-B98E-018B2DC49497}"/>
+              </a:ext>
+            </a:extLst>
+          </p:cNvPr>
+          <p:cNvSpPr>
+            <a:spLocks noGrp="1"/>
+          </p:cNvSpPr>
+          <p:nvPr>
+            <p:ph type="title"/>
+          </p:nvPr>
+        </p:nvSpPr>
+        <p:spPr>
+          <a:xfrm>
+            <a:off x="838200" y="365125"/>
+            <a:ext cx="10515600" cy="722895"/>
+          </a:xfrm>
+        </p:spPr>
+        <p:txBody>
+          <a:bodyPr/>
+          <a:lstStyle/>
+          <a:p>
+            <a:pPr algn="ctr"/>
+            <a:r>
+              <a:rPr lang="en-TW" dirty="0"/>
+              <a:t>Low-spatial-frequency filter</a:t>
+            </a:r>
+          </a:p>
+        </p:txBody>
+      </p:sp>
+      <p:pic>
+        <p:nvPicPr>
+          <p:cNvPr id="5" name="Content Placeholder 4">
+            <a:extLst>
+              <a:ext uri="{FF2B5EF4-FFF2-40B4-BE49-F238E27FC236}">
+                <a16:creationId xmlns:a16="http://schemas.microsoft.com/office/drawing/2014/main" id="{26B5B92C-C9B3-CCEA-2D1B-C51AD9AC5F4F}"/>
+              </a:ext>
+            </a:extLst>
+          </p:cNvPr>
+          <p:cNvPicPr>
+            <a:picLocks noGrp="1" noChangeAspect="1"/>
+          </p:cNvPicPr>
+          <p:nvPr>
+            <p:ph idx="1"/>
+          </p:nvPr>
+        </p:nvPicPr>
+        <p:blipFill>
+          <a:blip r:embed="rId2"/>
+          <a:stretch>
+            <a:fillRect/>
+          </a:stretch>
+        </p:blipFill>
+        <p:spPr>
+          <a:xfrm>
+            <a:off x="734054" y="3061584"/>
+            <a:ext cx="4941399" cy="3706049"/>
+          </a:xfrm>
+        </p:spPr>
+      </p:pic>
+      <p:pic>
+        <p:nvPicPr>
+          <p:cNvPr id="7" name="Picture 6">
+            <a:extLst>
+              <a:ext uri="{FF2B5EF4-FFF2-40B4-BE49-F238E27FC236}">
+                <a16:creationId xmlns:a16="http://schemas.microsoft.com/office/drawing/2014/main" id="{3CCF0CC5-A348-1132-B3BD-604340DA9229}"/>
+              </a:ext>
+            </a:extLst>
+          </p:cNvPr>
+          <p:cNvPicPr>
+            <a:picLocks noChangeAspect="1"/>
+          </p:cNvPicPr>
+          <p:nvPr/>
+        </p:nvPicPr>
+        <p:blipFill>
+          <a:blip r:embed="rId3"/>
+          <a:stretch>
+            <a:fillRect/>
+          </a:stretch>
+        </p:blipFill>
+        <p:spPr>
+          <a:xfrm>
+            <a:off x="283753" y="1192151"/>
+            <a:ext cx="5842000" cy="1765300"/>
+          </a:xfrm>
+          <a:prstGeom prst="rect">
+            <a:avLst/>
+          </a:prstGeom>
+        </p:spPr>
+      </p:pic>
+      <p:sp>
+        <p:nvSpPr>
+          <p:cNvPr id="8" name="TextBox 7">
+            <a:extLst>
+              <a:ext uri="{FF2B5EF4-FFF2-40B4-BE49-F238E27FC236}">
+                <a16:creationId xmlns:a16="http://schemas.microsoft.com/office/drawing/2014/main" id="{10CB07BE-8129-175E-91A1-56218B63BF11}"/>
+              </a:ext>
+            </a:extLst>
+          </p:cNvPr>
+          <p:cNvSpPr txBox="1"/>
+          <p:nvPr/>
+        </p:nvSpPr>
+        <p:spPr>
+          <a:xfrm>
+            <a:off x="5949051" y="1368192"/>
+            <a:ext cx="5404749" cy="923330"/>
+          </a:xfrm>
+          <a:prstGeom prst="rect">
+            <a:avLst/>
+          </a:prstGeom>
+          <a:noFill/>
+        </p:spPr>
+        <p:txBody>
+          <a:bodyPr wrap="none" rtlCol="0">
+            <a:spAutoFit/>
+          </a:bodyPr>
+          <a:lstStyle/>
+          <a:p>
+            <a:r>
+              <a:rPr lang="en-TW" dirty="0"/>
+              <a:t>3 versions of differ</a:t>
+            </a:r>
+            <a:r>
+              <a:rPr lang="en-US" dirty="0"/>
+              <a:t>e</a:t>
+            </a:r>
+            <a:r>
+              <a:rPr lang="en-TW" dirty="0"/>
+              <a:t>nt “hardness”:  </a:t>
+            </a:r>
+            <a:r>
+              <a:rPr lang="en-TW" dirty="0">
+                <a:solidFill>
+                  <a:srgbClr val="0070C0"/>
+                </a:solidFill>
+              </a:rPr>
+              <a:t>Boxcar</a:t>
+            </a:r>
+          </a:p>
+          <a:p>
+            <a:r>
+              <a:rPr lang="en-TW" dirty="0"/>
+              <a:t>			         </a:t>
+            </a:r>
+            <a:r>
+              <a:rPr lang="en-TW" dirty="0">
+                <a:solidFill>
+                  <a:schemeClr val="accent2"/>
+                </a:solidFill>
+              </a:rPr>
+              <a:t>“Quartic” (1 – e</a:t>
+            </a:r>
+            <a:r>
+              <a:rPr lang="en-TW" baseline="30000" dirty="0">
+                <a:solidFill>
+                  <a:schemeClr val="accent2"/>
+                </a:solidFill>
+              </a:rPr>
+              <a:t>– x^4</a:t>
+            </a:r>
+            <a:r>
+              <a:rPr lang="en-TW" dirty="0">
+                <a:solidFill>
+                  <a:schemeClr val="accent2"/>
+                </a:solidFill>
+              </a:rPr>
+              <a:t>) </a:t>
+            </a:r>
+            <a:endParaRPr lang="en-TW" dirty="0">
+              <a:solidFill>
+                <a:srgbClr val="0070C0"/>
+              </a:solidFill>
+            </a:endParaRPr>
+          </a:p>
+          <a:p>
+            <a:r>
+              <a:rPr lang="en-TW" dirty="0"/>
+              <a:t>			          </a:t>
+            </a:r>
+            <a:r>
+              <a:rPr lang="en-TW" dirty="0">
+                <a:solidFill>
+                  <a:srgbClr val="00B050"/>
+                </a:solidFill>
+              </a:rPr>
+              <a:t>Gaussian</a:t>
+            </a:r>
+          </a:p>
+        </p:txBody>
+      </p:sp>
+      <p:pic>
+        <p:nvPicPr>
+          <p:cNvPr id="10" name="Picture 9">
+            <a:extLst>
+              <a:ext uri="{FF2B5EF4-FFF2-40B4-BE49-F238E27FC236}">
+                <a16:creationId xmlns:a16="http://schemas.microsoft.com/office/drawing/2014/main" id="{D99CC5BF-6A4F-8551-D324-BC6C432DCBDD}"/>
+              </a:ext>
+            </a:extLst>
+          </p:cNvPr>
+          <p:cNvPicPr>
+            <a:picLocks noChangeAspect="1"/>
+          </p:cNvPicPr>
+          <p:nvPr/>
+        </p:nvPicPr>
+        <p:blipFill>
+          <a:blip r:embed="rId4"/>
+          <a:stretch>
+            <a:fillRect/>
+          </a:stretch>
+        </p:blipFill>
+        <p:spPr>
+          <a:xfrm>
+            <a:off x="6361145" y="2624248"/>
+            <a:ext cx="2218482" cy="1663862"/>
+          </a:xfrm>
+          <a:prstGeom prst="rect">
+            <a:avLst/>
+          </a:prstGeom>
+        </p:spPr>
+      </p:pic>
+      <p:pic>
+        <p:nvPicPr>
+          <p:cNvPr id="11" name="Picture 10">
+            <a:extLst>
+              <a:ext uri="{FF2B5EF4-FFF2-40B4-BE49-F238E27FC236}">
+                <a16:creationId xmlns:a16="http://schemas.microsoft.com/office/drawing/2014/main" id="{EC7418AF-9107-FF3E-559A-CDBC34EF803F}"/>
+              </a:ext>
+            </a:extLst>
+          </p:cNvPr>
+          <p:cNvPicPr>
+            <a:picLocks noChangeAspect="1"/>
+          </p:cNvPicPr>
+          <p:nvPr/>
+        </p:nvPicPr>
+        <p:blipFill>
+          <a:blip r:embed="rId5"/>
+          <a:srcRect/>
+          <a:stretch/>
+        </p:blipFill>
+        <p:spPr>
+          <a:xfrm>
+            <a:off x="8265183" y="3895939"/>
+            <a:ext cx="2218482" cy="1663861"/>
+          </a:xfrm>
+          <a:prstGeom prst="rect">
+            <a:avLst/>
+          </a:prstGeom>
+        </p:spPr>
+      </p:pic>
+      <p:pic>
+        <p:nvPicPr>
+          <p:cNvPr id="12" name="Picture 11">
+            <a:extLst>
+              <a:ext uri="{FF2B5EF4-FFF2-40B4-BE49-F238E27FC236}">
+                <a16:creationId xmlns:a16="http://schemas.microsoft.com/office/drawing/2014/main" id="{191E2876-83AA-EEA5-1588-4708178B1175}"/>
+              </a:ext>
+            </a:extLst>
+          </p:cNvPr>
+          <p:cNvPicPr>
+            <a:picLocks noChangeAspect="1"/>
+          </p:cNvPicPr>
+          <p:nvPr/>
+        </p:nvPicPr>
+        <p:blipFill>
+          <a:blip r:embed="rId6"/>
+          <a:srcRect/>
+          <a:stretch/>
+        </p:blipFill>
+        <p:spPr>
+          <a:xfrm>
+            <a:off x="6361145" y="5084575"/>
+            <a:ext cx="2218482" cy="1663861"/>
+          </a:xfrm>
+          <a:prstGeom prst="rect">
+            <a:avLst/>
+          </a:prstGeom>
+        </p:spPr>
+      </p:pic>
+      <p:sp>
+        <p:nvSpPr>
+          <p:cNvPr id="13" name="Rectangle 12">
+            <a:extLst>
+              <a:ext uri="{FF2B5EF4-FFF2-40B4-BE49-F238E27FC236}">
+                <a16:creationId xmlns:a16="http://schemas.microsoft.com/office/drawing/2014/main" id="{8FEFBE42-12E8-50D6-EB03-23163E55DAF3}"/>
+              </a:ext>
+            </a:extLst>
+          </p:cNvPr>
+          <p:cNvSpPr/>
+          <p:nvPr/>
+        </p:nvSpPr>
+        <p:spPr>
+          <a:xfrm>
+            <a:off x="2870520" y="4800965"/>
+            <a:ext cx="230058" cy="237310"/>
+          </a:xfrm>
+          <a:prstGeom prst="rect">
+            <a:avLst/>
+          </a:prstGeom>
+          <a:noFill/>
+          <a:ln w="19050">
+            <a:solidFill>
+              <a:schemeClr val="tx1"/>
+            </a:solidFill>
+          </a:ln>
+        </p:spPr>
+        <p:style>
+          <a:lnRef idx="2">
+            <a:schemeClr val="accent1">
+              <a:shade val="50000"/>
+            </a:schemeClr>
+          </a:lnRef>
+          <a:fillRef idx="1">
+            <a:schemeClr val="accent1"/>
+          </a:fillRef>
+          <a:effectRef idx="0">
+            <a:schemeClr val="accent1"/>
+          </a:effectRef>
+          <a:fontRef idx="minor">
+            <a:schemeClr val="lt1"/>
+          </a:fontRef>
+        </p:style>
+        <p:txBody>
+          <a:bodyPr rtlCol="0" anchor="ctr"/>
+          <a:lstStyle/>
+          <a:p>
+            <a:pPr algn="ctr"/>
+            <a:endParaRPr lang="en-TW"/>
+          </a:p>
+        </p:txBody>
+      </p:sp>
+      <p:cxnSp>
+        <p:nvCxnSpPr>
+          <p:cNvPr id="15" name="Curved Connector 14">
+            <a:extLst>
+              <a:ext uri="{FF2B5EF4-FFF2-40B4-BE49-F238E27FC236}">
+                <a16:creationId xmlns:a16="http://schemas.microsoft.com/office/drawing/2014/main" id="{4ABD83C4-D7AE-9206-9257-0E9F0C37440D}"/>
+              </a:ext>
+            </a:extLst>
+          </p:cNvPr>
+          <p:cNvCxnSpPr>
+            <a:cxnSpLocks/>
+            <a:endCxn id="10" idx="1"/>
+          </p:cNvCxnSpPr>
+          <p:nvPr/>
+        </p:nvCxnSpPr>
+        <p:spPr>
+          <a:xfrm flipV="1">
+            <a:off x="3100578" y="3456179"/>
+            <a:ext cx="3260567" cy="1458429"/>
+          </a:xfrm>
+          <a:prstGeom prst="curvedConnector3">
+            <a:avLst/>
+          </a:prstGeom>
+          <a:ln w="19050">
+            <a:tailEnd type="triangle"/>
+          </a:ln>
+        </p:spPr>
+        <p:style>
+          <a:lnRef idx="1">
+            <a:schemeClr val="accent1"/>
+          </a:lnRef>
+          <a:fillRef idx="0">
+            <a:schemeClr val="accent1"/>
+          </a:fillRef>
+          <a:effectRef idx="0">
+            <a:schemeClr val="accent1"/>
+          </a:effectRef>
+          <a:fontRef idx="minor">
+            <a:schemeClr val="tx1"/>
+          </a:fontRef>
+        </p:style>
+      </p:cxnSp>
+      <p:cxnSp>
+        <p:nvCxnSpPr>
+          <p:cNvPr id="17" name="Curved Connector 16">
+            <a:extLst>
+              <a:ext uri="{FF2B5EF4-FFF2-40B4-BE49-F238E27FC236}">
+                <a16:creationId xmlns:a16="http://schemas.microsoft.com/office/drawing/2014/main" id="{E7659CEA-C5F4-6E41-164F-9DC2E6659506}"/>
+              </a:ext>
+            </a:extLst>
+          </p:cNvPr>
+          <p:cNvCxnSpPr>
+            <a:cxnSpLocks/>
+            <a:endCxn id="12" idx="1"/>
+          </p:cNvCxnSpPr>
+          <p:nvPr/>
+        </p:nvCxnSpPr>
+        <p:spPr>
+          <a:xfrm>
+            <a:off x="3100578" y="4914608"/>
+            <a:ext cx="3260567" cy="1001898"/>
+          </a:xfrm>
+          <a:prstGeom prst="curvedConnector3">
+            <a:avLst/>
+          </a:prstGeom>
+          <a:ln w="19050">
+            <a:solidFill>
+              <a:srgbClr val="00B050"/>
+            </a:solidFill>
+            <a:tailEnd type="triangle"/>
+          </a:ln>
+        </p:spPr>
+        <p:style>
+          <a:lnRef idx="1">
+            <a:schemeClr val="accent1"/>
+          </a:lnRef>
+          <a:fillRef idx="0">
+            <a:schemeClr val="accent1"/>
+          </a:fillRef>
+          <a:effectRef idx="0">
+            <a:schemeClr val="accent1"/>
+          </a:effectRef>
+          <a:fontRef idx="minor">
+            <a:schemeClr val="tx1"/>
+          </a:fontRef>
+        </p:style>
+      </p:cxnSp>
+      <p:cxnSp>
+        <p:nvCxnSpPr>
+          <p:cNvPr id="22" name="Straight Arrow Connector 21">
+            <a:extLst>
+              <a:ext uri="{FF2B5EF4-FFF2-40B4-BE49-F238E27FC236}">
+                <a16:creationId xmlns:a16="http://schemas.microsoft.com/office/drawing/2014/main" id="{AF17117D-F036-C25D-D8D8-1436C5F98B89}"/>
+              </a:ext>
+            </a:extLst>
+          </p:cNvPr>
+          <p:cNvCxnSpPr>
+            <a:endCxn id="11" idx="1"/>
+          </p:cNvCxnSpPr>
+          <p:nvPr/>
+        </p:nvCxnSpPr>
+        <p:spPr>
+          <a:xfrm flipV="1">
+            <a:off x="3100578" y="4727870"/>
+            <a:ext cx="5164605" cy="186738"/>
+          </a:xfrm>
+          <a:prstGeom prst="straightConnector1">
+            <a:avLst/>
+          </a:prstGeom>
+          <a:ln w="19050">
+            <a:tailEnd type="triangle"/>
+          </a:ln>
+        </p:spPr>
+        <p:style>
+          <a:lnRef idx="1">
+            <a:schemeClr val="accent2"/>
+          </a:lnRef>
+          <a:fillRef idx="0">
+            <a:schemeClr val="accent2"/>
+          </a:fillRef>
+          <a:effectRef idx="0">
+            <a:schemeClr val="accent2"/>
+          </a:effectRef>
+          <a:fontRef idx="minor">
+            <a:schemeClr val="tx1"/>
+          </a:fontRef>
+        </p:style>
+      </p:cxnSp>
+    </p:spTree>
+    <p:extLst>
+      <p:ext uri="{BB962C8B-B14F-4D97-AF65-F5344CB8AC3E}">
+        <p14:creationId xmlns:p14="http://schemas.microsoft.com/office/powerpoint/2010/main" val="4253717260"/>
+      </p:ext>
+    </p:extLst>
+  </p:cSld>
+  <p:clrMapOvr>
+    <a:masterClrMapping/>
+  </p:clrMapOvr>
+</p:sld>
+</file>
+
+<file path=ppt/slides/slide3.xml><?xml version="1.0" encoding="utf-8"?>
+<p:sld xmlns:a="http://schemas.openxmlformats.org/drawingml/2006/main" xmlns:r="http://schemas.openxmlformats.org/officeDocument/2006/relationships" xmlns:p="http://schemas.openxmlformats.org/presentationml/2006/main">
+  <p:cSld>
+    <p:spTree>
+      <p:nvGrpSpPr>
+        <p:cNvPr id="1" name=""/>
+        <p:cNvGrpSpPr/>
+        <p:nvPr/>
+      </p:nvGrpSpPr>
+      <p:grpSpPr>
+        <a:xfrm>
+          <a:off x="0" y="0"/>
+          <a:ext cx="0" cy="0"/>
+          <a:chOff x="0" y="0"/>
+          <a:chExt cx="0" cy="0"/>
+        </a:xfrm>
+      </p:grpSpPr>
+      <p:sp>
+        <p:nvSpPr>
+          <p:cNvPr id="2" name="Title 1">
+            <a:extLst>
+              <a:ext uri="{FF2B5EF4-FFF2-40B4-BE49-F238E27FC236}">
+                <a16:creationId xmlns:a16="http://schemas.microsoft.com/office/drawing/2014/main" id="{D14C5DF8-D143-9132-4847-29506EFDE1B3}"/>
+              </a:ext>
+            </a:extLst>
+          </p:cNvPr>
+          <p:cNvSpPr>
+            <a:spLocks noGrp="1"/>
+          </p:cNvSpPr>
+          <p:nvPr>
+            <p:ph type="title"/>
+          </p:nvPr>
+        </p:nvSpPr>
+        <p:spPr>
+          <a:xfrm>
+            <a:off x="838200" y="365125"/>
+            <a:ext cx="10515600" cy="722895"/>
+          </a:xfrm>
+        </p:spPr>
+        <p:txBody>
+          <a:bodyPr/>
+          <a:lstStyle/>
+          <a:p>
+            <a:pPr algn="ctr"/>
+            <a:r>
+              <a:rPr lang="en-TW" dirty="0"/>
+              <a:t>Filament, boxcar filter</a:t>
+            </a:r>
+          </a:p>
+        </p:txBody>
+      </p:sp>
+      <p:pic>
+        <p:nvPicPr>
+          <p:cNvPr id="5" name="Content Placeholder 4">
+            <a:extLst>
+              <a:ext uri="{FF2B5EF4-FFF2-40B4-BE49-F238E27FC236}">
+                <a16:creationId xmlns:a16="http://schemas.microsoft.com/office/drawing/2014/main" id="{819DF4A4-013B-14C8-4FCE-079F79A8D550}"/>
+              </a:ext>
+            </a:extLst>
+          </p:cNvPr>
+          <p:cNvPicPr>
+            <a:picLocks noGrp="1" noChangeAspect="1"/>
+          </p:cNvPicPr>
+          <p:nvPr>
+            <p:ph idx="1"/>
+          </p:nvPr>
+        </p:nvPicPr>
+        <p:blipFill>
+          <a:blip r:embed="rId2"/>
+          <a:stretch>
+            <a:fillRect/>
+          </a:stretch>
+        </p:blipFill>
+        <p:spPr>
+          <a:xfrm>
+            <a:off x="294216" y="1524683"/>
+            <a:ext cx="5801784" cy="4351338"/>
+          </a:xfrm>
+        </p:spPr>
+      </p:pic>
+      <p:pic>
+        <p:nvPicPr>
+          <p:cNvPr id="6" name="Content Placeholder 4">
+            <a:extLst>
+              <a:ext uri="{FF2B5EF4-FFF2-40B4-BE49-F238E27FC236}">
+                <a16:creationId xmlns:a16="http://schemas.microsoft.com/office/drawing/2014/main" id="{D9A9B873-A8E6-0993-607A-CC63EF6982F4}"/>
+              </a:ext>
+            </a:extLst>
+          </p:cNvPr>
+          <p:cNvPicPr>
+            <a:picLocks noChangeAspect="1"/>
+          </p:cNvPicPr>
+          <p:nvPr/>
+        </p:nvPicPr>
+        <p:blipFill>
+          <a:blip r:embed="rId3"/>
+          <a:srcRect/>
+          <a:stretch/>
+        </p:blipFill>
+        <p:spPr>
+          <a:xfrm>
+            <a:off x="6390216" y="1524683"/>
+            <a:ext cx="5801784" cy="4351338"/>
+          </a:xfrm>
+          <a:prstGeom prst="rect">
+            <a:avLst/>
+          </a:prstGeom>
+        </p:spPr>
+      </p:pic>
+      <p:sp>
+        <p:nvSpPr>
+          <p:cNvPr id="7" name="TextBox 6">
+            <a:extLst>
+              <a:ext uri="{FF2B5EF4-FFF2-40B4-BE49-F238E27FC236}">
+                <a16:creationId xmlns:a16="http://schemas.microsoft.com/office/drawing/2014/main" id="{60C25913-6EF8-CD04-5B5D-2CADB99473E7}"/>
+              </a:ext>
+            </a:extLst>
+          </p:cNvPr>
+          <p:cNvSpPr txBox="1"/>
+          <p:nvPr/>
+        </p:nvSpPr>
+        <p:spPr>
+          <a:xfrm>
+            <a:off x="2614660" y="1524683"/>
+            <a:ext cx="1160895" cy="461665"/>
+          </a:xfrm>
+          <a:prstGeom prst="rect">
+            <a:avLst/>
+          </a:prstGeom>
+          <a:noFill/>
+        </p:spPr>
+        <p:txBody>
+          <a:bodyPr wrap="none" rtlCol="0">
+            <a:spAutoFit/>
+          </a:bodyPr>
+          <a:lstStyle/>
+          <a:p>
+            <a:r>
+              <a:rPr lang="en-TW" sz="2400" dirty="0"/>
+              <a:t>Original</a:t>
+            </a:r>
+          </a:p>
+        </p:txBody>
+      </p:sp>
+      <p:sp>
+        <p:nvSpPr>
+          <p:cNvPr id="8" name="TextBox 7">
+            <a:extLst>
+              <a:ext uri="{FF2B5EF4-FFF2-40B4-BE49-F238E27FC236}">
+                <a16:creationId xmlns:a16="http://schemas.microsoft.com/office/drawing/2014/main" id="{8F308B61-293D-C5FE-D783-4893ED099B4E}"/>
+              </a:ext>
+            </a:extLst>
+          </p:cNvPr>
+          <p:cNvSpPr txBox="1"/>
+          <p:nvPr/>
+        </p:nvSpPr>
+        <p:spPr>
+          <a:xfrm>
+            <a:off x="8721561" y="1524683"/>
+            <a:ext cx="1139094" cy="461665"/>
+          </a:xfrm>
+          <a:prstGeom prst="rect">
+            <a:avLst/>
+          </a:prstGeom>
+          <a:noFill/>
+        </p:spPr>
+        <p:txBody>
+          <a:bodyPr wrap="none" rtlCol="0">
+            <a:spAutoFit/>
+          </a:bodyPr>
+          <a:lstStyle/>
+          <a:p>
+            <a:r>
+              <a:rPr lang="en-TW" sz="2400" dirty="0"/>
+              <a:t>Filtered</a:t>
+            </a:r>
+          </a:p>
+        </p:txBody>
+      </p:sp>
+    </p:spTree>
+    <p:extLst>
+      <p:ext uri="{BB962C8B-B14F-4D97-AF65-F5344CB8AC3E}">
+        <p14:creationId xmlns:p14="http://schemas.microsoft.com/office/powerpoint/2010/main" val="2557085842"/>
+      </p:ext>
+    </p:extLst>
+  </p:cSld>
+  <p:clrMapOvr>
+    <a:masterClrMapping/>
+  </p:clrMapOvr>
+</p:sld>
+</file>
+
+<file path=ppt/slides/slide4.xml><?xml version="1.0" encoding="utf-8"?>
+<p:sld xmlns:a="http://schemas.openxmlformats.org/drawingml/2006/main" xmlns:r="http://schemas.openxmlformats.org/officeDocument/2006/relationships" xmlns:p="http://schemas.openxmlformats.org/presentationml/2006/main">
+  <p:cSld>
+    <p:spTree>
+      <p:nvGrpSpPr>
+        <p:cNvPr id="1" name=""/>
+        <p:cNvGrpSpPr/>
+        <p:nvPr/>
+      </p:nvGrpSpPr>
+      <p:grpSpPr>
+        <a:xfrm>
+          <a:off x="0" y="0"/>
+          <a:ext cx="0" cy="0"/>
+          <a:chOff x="0" y="0"/>
+          <a:chExt cx="0" cy="0"/>
+        </a:xfrm>
+      </p:grpSpPr>
+      <p:sp>
+        <p:nvSpPr>
+          <p:cNvPr id="2" name="Title 1">
+            <a:extLst>
+              <a:ext uri="{FF2B5EF4-FFF2-40B4-BE49-F238E27FC236}">
+                <a16:creationId xmlns:a16="http://schemas.microsoft.com/office/drawing/2014/main" id="{D14C5DF8-D143-9132-4847-29506EFDE1B3}"/>
+              </a:ext>
+            </a:extLst>
+          </p:cNvPr>
+          <p:cNvSpPr>
+            <a:spLocks noGrp="1"/>
+          </p:cNvSpPr>
+          <p:nvPr>
+            <p:ph type="title"/>
+          </p:nvPr>
+        </p:nvSpPr>
+        <p:spPr>
+          <a:xfrm>
+            <a:off x="838200" y="365125"/>
+            <a:ext cx="10515600" cy="722895"/>
+          </a:xfrm>
+        </p:spPr>
+        <p:txBody>
+          <a:bodyPr/>
+          <a:lstStyle/>
+          <a:p>
+            <a:pPr algn="ctr"/>
+            <a:r>
+              <a:rPr lang="en-TW" dirty="0"/>
+              <a:t>Filament, “quartic” filter</a:t>
+            </a:r>
+          </a:p>
+        </p:txBody>
+      </p:sp>
+      <p:pic>
+        <p:nvPicPr>
+          <p:cNvPr id="5" name="Content Placeholder 4">
+            <a:extLst>
+              <a:ext uri="{FF2B5EF4-FFF2-40B4-BE49-F238E27FC236}">
+                <a16:creationId xmlns:a16="http://schemas.microsoft.com/office/drawing/2014/main" id="{819DF4A4-013B-14C8-4FCE-079F79A8D550}"/>
+              </a:ext>
+            </a:extLst>
+          </p:cNvPr>
+          <p:cNvPicPr>
+            <a:picLocks noGrp="1" noChangeAspect="1"/>
+          </p:cNvPicPr>
+          <p:nvPr>
+            <p:ph idx="1"/>
+          </p:nvPr>
+        </p:nvPicPr>
+        <p:blipFill>
+          <a:blip r:embed="rId2"/>
+          <a:stretch>
+            <a:fillRect/>
+          </a:stretch>
+        </p:blipFill>
+        <p:spPr>
+          <a:xfrm>
+            <a:off x="294216" y="1524683"/>
+            <a:ext cx="5801784" cy="4351338"/>
+          </a:xfrm>
+        </p:spPr>
+      </p:pic>
+      <p:pic>
+        <p:nvPicPr>
+          <p:cNvPr id="6" name="Content Placeholder 4">
+            <a:extLst>
+              <a:ext uri="{FF2B5EF4-FFF2-40B4-BE49-F238E27FC236}">
+                <a16:creationId xmlns:a16="http://schemas.microsoft.com/office/drawing/2014/main" id="{D9A9B873-A8E6-0993-607A-CC63EF6982F4}"/>
+              </a:ext>
+            </a:extLst>
+          </p:cNvPr>
+          <p:cNvPicPr>
+            <a:picLocks noChangeAspect="1"/>
+          </p:cNvPicPr>
+          <p:nvPr/>
+        </p:nvPicPr>
+        <p:blipFill>
+          <a:blip r:embed="rId3"/>
+          <a:srcRect/>
+          <a:stretch/>
+        </p:blipFill>
+        <p:spPr>
+          <a:xfrm>
+            <a:off x="6390216" y="1524683"/>
+            <a:ext cx="5801784" cy="4351338"/>
+          </a:xfrm>
+          <a:prstGeom prst="rect">
+            <a:avLst/>
+          </a:prstGeom>
+        </p:spPr>
+      </p:pic>
+      <p:sp>
+        <p:nvSpPr>
+          <p:cNvPr id="7" name="TextBox 6">
+            <a:extLst>
+              <a:ext uri="{FF2B5EF4-FFF2-40B4-BE49-F238E27FC236}">
+                <a16:creationId xmlns:a16="http://schemas.microsoft.com/office/drawing/2014/main" id="{60C25913-6EF8-CD04-5B5D-2CADB99473E7}"/>
+              </a:ext>
+            </a:extLst>
+          </p:cNvPr>
+          <p:cNvSpPr txBox="1"/>
+          <p:nvPr/>
+        </p:nvSpPr>
+        <p:spPr>
+          <a:xfrm>
+            <a:off x="2614660" y="1524683"/>
+            <a:ext cx="1160895" cy="461665"/>
+          </a:xfrm>
+          <a:prstGeom prst="rect">
+            <a:avLst/>
+          </a:prstGeom>
+          <a:noFill/>
+        </p:spPr>
+        <p:txBody>
+          <a:bodyPr wrap="none" rtlCol="0">
+            <a:spAutoFit/>
+          </a:bodyPr>
+          <a:lstStyle/>
+          <a:p>
+            <a:r>
+              <a:rPr lang="en-TW" sz="2400" dirty="0"/>
+              <a:t>Original</a:t>
+            </a:r>
+          </a:p>
+        </p:txBody>
+      </p:sp>
+      <p:sp>
+        <p:nvSpPr>
+          <p:cNvPr id="8" name="TextBox 7">
+            <a:extLst>
+              <a:ext uri="{FF2B5EF4-FFF2-40B4-BE49-F238E27FC236}">
+                <a16:creationId xmlns:a16="http://schemas.microsoft.com/office/drawing/2014/main" id="{8F308B61-293D-C5FE-D783-4893ED099B4E}"/>
+              </a:ext>
+            </a:extLst>
+          </p:cNvPr>
+          <p:cNvSpPr txBox="1"/>
+          <p:nvPr/>
+        </p:nvSpPr>
+        <p:spPr>
+          <a:xfrm>
+            <a:off x="8721561" y="1524683"/>
+            <a:ext cx="1139094" cy="461665"/>
+          </a:xfrm>
+          <a:prstGeom prst="rect">
+            <a:avLst/>
+          </a:prstGeom>
+          <a:noFill/>
+        </p:spPr>
+        <p:txBody>
+          <a:bodyPr wrap="none" rtlCol="0">
+            <a:spAutoFit/>
+          </a:bodyPr>
+          <a:lstStyle/>
+          <a:p>
+            <a:r>
+              <a:rPr lang="en-TW" sz="2400" dirty="0"/>
+              <a:t>Filtered</a:t>
+            </a:r>
+          </a:p>
+        </p:txBody>
+      </p:sp>
+    </p:spTree>
+    <p:extLst>
+      <p:ext uri="{BB962C8B-B14F-4D97-AF65-F5344CB8AC3E}">
+        <p14:creationId xmlns:p14="http://schemas.microsoft.com/office/powerpoint/2010/main" val="1693958540"/>
+      </p:ext>
+    </p:extLst>
+  </p:cSld>
+  <p:clrMapOvr>
+    <a:masterClrMapping/>
+  </p:clrMapOvr>
+</p:sld>
+</file>
+
+<file path=ppt/slides/slide5.xml><?xml version="1.0" encoding="utf-8"?>
+<p:sld xmlns:a="http://schemas.openxmlformats.org/drawingml/2006/main" xmlns:r="http://schemas.openxmlformats.org/officeDocument/2006/relationships" xmlns:p="http://schemas.openxmlformats.org/presentationml/2006/main">
+  <p:cSld>
+    <p:spTree>
+      <p:nvGrpSpPr>
+        <p:cNvPr id="1" name=""/>
+        <p:cNvGrpSpPr/>
+        <p:nvPr/>
+      </p:nvGrpSpPr>
+      <p:grpSpPr>
+        <a:xfrm>
+          <a:off x="0" y="0"/>
+          <a:ext cx="0" cy="0"/>
+          <a:chOff x="0" y="0"/>
+          <a:chExt cx="0" cy="0"/>
+        </a:xfrm>
+      </p:grpSpPr>
+      <p:sp>
+        <p:nvSpPr>
+          <p:cNvPr id="2" name="Title 1">
+            <a:extLst>
+              <a:ext uri="{FF2B5EF4-FFF2-40B4-BE49-F238E27FC236}">
+                <a16:creationId xmlns:a16="http://schemas.microsoft.com/office/drawing/2014/main" id="{D14C5DF8-D143-9132-4847-29506EFDE1B3}"/>
+              </a:ext>
+            </a:extLst>
+          </p:cNvPr>
+          <p:cNvSpPr>
+            <a:spLocks noGrp="1"/>
+          </p:cNvSpPr>
+          <p:nvPr>
+            <p:ph type="title"/>
+          </p:nvPr>
+        </p:nvSpPr>
+        <p:spPr>
+          <a:xfrm>
+            <a:off x="838200" y="365125"/>
+            <a:ext cx="10515600" cy="722895"/>
+          </a:xfrm>
+        </p:spPr>
+        <p:txBody>
+          <a:bodyPr/>
+          <a:lstStyle/>
+          <a:p>
+            <a:pPr algn="ctr"/>
+            <a:r>
+              <a:rPr lang="en-TW" dirty="0"/>
+              <a:t>Filament, Gaussian filter</a:t>
+            </a:r>
+          </a:p>
+        </p:txBody>
+      </p:sp>
+      <p:pic>
+        <p:nvPicPr>
+          <p:cNvPr id="5" name="Content Placeholder 4">
+            <a:extLst>
+              <a:ext uri="{FF2B5EF4-FFF2-40B4-BE49-F238E27FC236}">
+                <a16:creationId xmlns:a16="http://schemas.microsoft.com/office/drawing/2014/main" id="{819DF4A4-013B-14C8-4FCE-079F79A8D550}"/>
+              </a:ext>
+            </a:extLst>
+          </p:cNvPr>
+          <p:cNvPicPr>
+            <a:picLocks noGrp="1" noChangeAspect="1"/>
+          </p:cNvPicPr>
+          <p:nvPr>
+            <p:ph idx="1"/>
+          </p:nvPr>
+        </p:nvPicPr>
+        <p:blipFill>
+          <a:blip r:embed="rId2"/>
+          <a:stretch>
+            <a:fillRect/>
+          </a:stretch>
+        </p:blipFill>
+        <p:spPr>
+          <a:xfrm>
+            <a:off x="294216" y="1524683"/>
+            <a:ext cx="5801784" cy="4351338"/>
+          </a:xfrm>
+        </p:spPr>
+      </p:pic>
+      <p:pic>
+        <p:nvPicPr>
+          <p:cNvPr id="6" name="Content Placeholder 4">
+            <a:extLst>
+              <a:ext uri="{FF2B5EF4-FFF2-40B4-BE49-F238E27FC236}">
+                <a16:creationId xmlns:a16="http://schemas.microsoft.com/office/drawing/2014/main" id="{D9A9B873-A8E6-0993-607A-CC63EF6982F4}"/>
+              </a:ext>
+            </a:extLst>
+          </p:cNvPr>
+          <p:cNvPicPr>
+            <a:picLocks noChangeAspect="1"/>
+          </p:cNvPicPr>
+          <p:nvPr/>
+        </p:nvPicPr>
+        <p:blipFill>
+          <a:blip r:embed="rId3"/>
+          <a:srcRect/>
+          <a:stretch/>
+        </p:blipFill>
+        <p:spPr>
+          <a:xfrm>
+            <a:off x="6390216" y="1524683"/>
+            <a:ext cx="5801784" cy="4351338"/>
+          </a:xfrm>
+          <a:prstGeom prst="rect">
+            <a:avLst/>
+          </a:prstGeom>
+        </p:spPr>
+      </p:pic>
+      <p:sp>
+        <p:nvSpPr>
+          <p:cNvPr id="7" name="TextBox 6">
+            <a:extLst>
+              <a:ext uri="{FF2B5EF4-FFF2-40B4-BE49-F238E27FC236}">
+                <a16:creationId xmlns:a16="http://schemas.microsoft.com/office/drawing/2014/main" id="{60C25913-6EF8-CD04-5B5D-2CADB99473E7}"/>
+              </a:ext>
+            </a:extLst>
+          </p:cNvPr>
+          <p:cNvSpPr txBox="1"/>
+          <p:nvPr/>
+        </p:nvSpPr>
+        <p:spPr>
+          <a:xfrm>
+            <a:off x="2614660" y="1524683"/>
+            <a:ext cx="1160895" cy="461665"/>
+          </a:xfrm>
+          <a:prstGeom prst="rect">
+            <a:avLst/>
+          </a:prstGeom>
+          <a:noFill/>
+        </p:spPr>
+        <p:txBody>
+          <a:bodyPr wrap="none" rtlCol="0">
+            <a:spAutoFit/>
+          </a:bodyPr>
+          <a:lstStyle/>
+          <a:p>
+            <a:r>
+              <a:rPr lang="en-TW" sz="2400" dirty="0"/>
+              <a:t>Original</a:t>
+            </a:r>
+          </a:p>
+        </p:txBody>
+      </p:sp>
+      <p:sp>
+        <p:nvSpPr>
+          <p:cNvPr id="8" name="TextBox 7">
+            <a:extLst>
+              <a:ext uri="{FF2B5EF4-FFF2-40B4-BE49-F238E27FC236}">
+                <a16:creationId xmlns:a16="http://schemas.microsoft.com/office/drawing/2014/main" id="{8F308B61-293D-C5FE-D783-4893ED099B4E}"/>
+              </a:ext>
+            </a:extLst>
+          </p:cNvPr>
+          <p:cNvSpPr txBox="1"/>
+          <p:nvPr/>
+        </p:nvSpPr>
+        <p:spPr>
+          <a:xfrm>
+            <a:off x="8721561" y="1524683"/>
+            <a:ext cx="1139094" cy="461665"/>
+          </a:xfrm>
+          <a:prstGeom prst="rect">
+            <a:avLst/>
+          </a:prstGeom>
+          <a:noFill/>
+        </p:spPr>
+        <p:txBody>
+          <a:bodyPr wrap="none" rtlCol="0">
+            <a:spAutoFit/>
+          </a:bodyPr>
+          <a:lstStyle/>
+          <a:p>
+            <a:r>
+              <a:rPr lang="en-TW" sz="2400" dirty="0"/>
+              <a:t>Filtered</a:t>
+            </a:r>
+          </a:p>
+        </p:txBody>
+      </p:sp>
+    </p:spTree>
+    <p:extLst>
+      <p:ext uri="{BB962C8B-B14F-4D97-AF65-F5344CB8AC3E}">
+        <p14:creationId xmlns:p14="http://schemas.microsoft.com/office/powerpoint/2010/main" val="2420699893"/>
       </p:ext>
     </p:extLst>
   </p:cSld>

</xml_diff>